<commit_message>
- Organize the code. - Fix Visualizations.
</commit_message>
<xml_diff>
--- a/Heat_Maps_presention.pptx
+++ b/Heat_Maps_presention.pptx
@@ -223,7 +223,7 @@
           <a:p>
             <a:fld id="{C376BEA7-FE57-4951-BAB3-1AA31314EE05}" type="datetimeFigureOut">
               <a:rPr lang="he-IL" smtClean="0"/>
-              <a:t>ט'/אדר/תשפ"א</a:t>
+              <a:t>י"ז/אדר/תשפ"א</a:t>
             </a:fld>
             <a:endParaRPr lang="he-IL"/>
           </a:p>
@@ -1053,7 +1053,7 @@
             <a:fld id="{5ECD8B30-1B71-45A1-8314-D59C86F581E1}" type="datetime1">
               <a:rPr lang="en-US" smtClean="0"/>
               <a:pPr/>
-              <a:t>2/21/2021</a:t>
+              <a:t>3/1/2021</a:t>
             </a:fld>
             <a:endParaRPr lang="en-US" b="1" dirty="0"/>
           </a:p>
@@ -1268,7 +1268,7 @@
             <a:fld id="{5ECD8B30-1B71-45A1-8314-D59C86F581E1}" type="datetime1">
               <a:rPr lang="en-US" smtClean="0"/>
               <a:pPr/>
-              <a:t>2/21/2021</a:t>
+              <a:t>3/1/2021</a:t>
             </a:fld>
             <a:endParaRPr lang="en-US" b="1" dirty="0"/>
           </a:p>
@@ -1531,7 +1531,7 @@
             <a:fld id="{5ECD8B30-1B71-45A1-8314-D59C86F581E1}" type="datetime1">
               <a:rPr lang="en-US" smtClean="0"/>
               <a:pPr/>
-              <a:t>2/21/2021</a:t>
+              <a:t>3/1/2021</a:t>
             </a:fld>
             <a:endParaRPr lang="en-US" b="1" dirty="0"/>
           </a:p>
@@ -1712,7 +1712,7 @@
             <a:fld id="{5ECD8B30-1B71-45A1-8314-D59C86F581E1}" type="datetime1">
               <a:rPr lang="en-US" smtClean="0"/>
               <a:pPr/>
-              <a:t>2/21/2021</a:t>
+              <a:t>3/1/2021</a:t>
             </a:fld>
             <a:endParaRPr lang="en-US" b="1" dirty="0"/>
           </a:p>
@@ -2062,7 +2062,7 @@
             <a:fld id="{5ECD8B30-1B71-45A1-8314-D59C86F581E1}" type="datetime1">
               <a:rPr lang="en-US" smtClean="0"/>
               <a:pPr/>
-              <a:t>2/21/2021</a:t>
+              <a:t>3/1/2021</a:t>
             </a:fld>
             <a:endParaRPr lang="en-US" b="1" dirty="0"/>
           </a:p>
@@ -2344,7 +2344,7 @@
             <a:fld id="{5ECD8B30-1B71-45A1-8314-D59C86F581E1}" type="datetime1">
               <a:rPr lang="en-US" smtClean="0"/>
               <a:pPr/>
-              <a:t>2/21/2021</a:t>
+              <a:t>3/1/2021</a:t>
             </a:fld>
             <a:endParaRPr lang="en-US" b="1" dirty="0"/>
           </a:p>
@@ -2730,7 +2730,7 @@
             <a:fld id="{5ECD8B30-1B71-45A1-8314-D59C86F581E1}" type="datetime1">
               <a:rPr lang="en-US" smtClean="0"/>
               <a:pPr/>
-              <a:t>2/21/2021</a:t>
+              <a:t>3/1/2021</a:t>
             </a:fld>
             <a:endParaRPr lang="en-US" b="1" dirty="0"/>
           </a:p>
@@ -2855,7 +2855,7 @@
             <a:fld id="{5ECD8B30-1B71-45A1-8314-D59C86F581E1}" type="datetime1">
               <a:rPr lang="en-US" smtClean="0"/>
               <a:pPr/>
-              <a:t>2/21/2021</a:t>
+              <a:t>3/1/2021</a:t>
             </a:fld>
             <a:endParaRPr lang="en-US" b="1" dirty="0"/>
           </a:p>
@@ -3033,7 +3033,7 @@
             <a:fld id="{5ECD8B30-1B71-45A1-8314-D59C86F581E1}" type="datetime1">
               <a:rPr lang="en-US" smtClean="0"/>
               <a:pPr/>
-              <a:t>2/21/2021</a:t>
+              <a:t>3/1/2021</a:t>
             </a:fld>
             <a:endParaRPr lang="en-US" b="1" dirty="0"/>
           </a:p>
@@ -3394,7 +3394,7 @@
             <a:fld id="{5ECD8B30-1B71-45A1-8314-D59C86F581E1}" type="datetime1">
               <a:rPr lang="en-US" smtClean="0"/>
               <a:pPr/>
-              <a:t>2/21/2021</a:t>
+              <a:t>3/1/2021</a:t>
             </a:fld>
             <a:endParaRPr lang="en-US" b="1" dirty="0"/>
           </a:p>
@@ -3783,7 +3783,7 @@
             <a:fld id="{5ECD8B30-1B71-45A1-8314-D59C86F581E1}" type="datetime1">
               <a:rPr lang="en-US" smtClean="0"/>
               <a:pPr/>
-              <a:t>2/21/2021</a:t>
+              <a:t>3/1/2021</a:t>
             </a:fld>
             <a:endParaRPr lang="en-US" b="1" dirty="0"/>
           </a:p>
@@ -4077,7 +4077,7 @@
             <a:fld id="{5ECD8B30-1B71-45A1-8314-D59C86F581E1}" type="datetime1">
               <a:rPr lang="en-US" smtClean="0"/>
               <a:pPr/>
-              <a:t>2/21/2021</a:t>
+              <a:t>3/1/2021</a:t>
             </a:fld>
             <a:endParaRPr lang="en-US" b="1" dirty="0"/>
           </a:p>
@@ -6539,10 +6539,10 @@
       </p:pic>
       <p:pic>
         <p:nvPicPr>
-          <p:cNvPr id="7" name="תמונה 6">
+          <p:cNvPr id="4" name="תמונה 3">
             <a:extLst>
               <a:ext uri="{FF2B5EF4-FFF2-40B4-BE49-F238E27FC236}">
-                <a16:creationId xmlns:a16="http://schemas.microsoft.com/office/drawing/2014/main" id="{D50DDE88-3F66-4074-A88C-0F2AAA9C8534}"/>
+                <a16:creationId xmlns:a16="http://schemas.microsoft.com/office/drawing/2014/main" id="{244E6784-1DE8-433C-BAFA-435C7E2FCFF0}"/>
               </a:ext>
             </a:extLst>
           </p:cNvPr>
@@ -6565,8 +6565,8 @@
         </p:blipFill>
         <p:spPr>
           <a:xfrm>
-            <a:off x="6220989" y="2151759"/>
-            <a:ext cx="5613583" cy="3275435"/>
+            <a:off x="5918674" y="2018047"/>
+            <a:ext cx="5923809" cy="3542857"/>
           </a:xfrm>
           <a:prstGeom prst="rect">
             <a:avLst/>
@@ -7543,12 +7543,48 @@
           </a:p>
         </p:txBody>
       </p:sp>
+      <p:sp>
+        <p:nvSpPr>
+          <p:cNvPr id="8" name="תיבת טקסט 7">
+            <a:extLst>
+              <a:ext uri="{FF2B5EF4-FFF2-40B4-BE49-F238E27FC236}">
+                <a16:creationId xmlns:a16="http://schemas.microsoft.com/office/drawing/2014/main" id="{67AD5C5D-EAA0-4CC7-99EF-54AC5696FA7D}"/>
+              </a:ext>
+            </a:extLst>
+          </p:cNvPr>
+          <p:cNvSpPr txBox="1"/>
+          <p:nvPr/>
+        </p:nvSpPr>
+        <p:spPr>
+          <a:xfrm>
+            <a:off x="6834976" y="2262976"/>
+            <a:ext cx="4598313" cy="1200329"/>
+          </a:xfrm>
+          <a:prstGeom prst="rect">
+            <a:avLst/>
+          </a:prstGeom>
+          <a:noFill/>
+        </p:spPr>
+        <p:txBody>
+          <a:bodyPr wrap="square" rtlCol="1">
+            <a:spAutoFit/>
+          </a:bodyPr>
+          <a:lstStyle/>
+          <a:p>
+            <a:r>
+              <a:rPr lang="en-US" dirty="0"/>
+              <a:t>We can see that for vegetation category, the linear pipeline model had the most accurate prediction, test accuracy with 49.57% and train accuracy with 51.03% </a:t>
+            </a:r>
+            <a:endParaRPr lang="he-IL" dirty="0"/>
+          </a:p>
+        </p:txBody>
+      </p:sp>
       <p:pic>
         <p:nvPicPr>
-          <p:cNvPr id="7" name="מציין מיקום תוכן 6">
+          <p:cNvPr id="12" name="מציין מיקום תוכן 11">
             <a:extLst>
               <a:ext uri="{FF2B5EF4-FFF2-40B4-BE49-F238E27FC236}">
-                <a16:creationId xmlns:a16="http://schemas.microsoft.com/office/drawing/2014/main" id="{F27EBFF3-780C-485C-94A0-B604326635BF}"/>
+                <a16:creationId xmlns:a16="http://schemas.microsoft.com/office/drawing/2014/main" id="{D0528B59-6F36-4142-BABB-5EA66C19BD67}"/>
               </a:ext>
             </a:extLst>
           </p:cNvPr>
@@ -7573,47 +7609,11 @@
         </p:blipFill>
         <p:spPr>
           <a:xfrm>
-            <a:off x="1097280" y="1846263"/>
-            <a:ext cx="5483090" cy="4022725"/>
+            <a:off x="1036320" y="1737360"/>
+            <a:ext cx="5507623" cy="4022725"/>
           </a:xfrm>
         </p:spPr>
       </p:pic>
-      <p:sp>
-        <p:nvSpPr>
-          <p:cNvPr id="8" name="תיבת טקסט 7">
-            <a:extLst>
-              <a:ext uri="{FF2B5EF4-FFF2-40B4-BE49-F238E27FC236}">
-                <a16:creationId xmlns:a16="http://schemas.microsoft.com/office/drawing/2014/main" id="{67AD5C5D-EAA0-4CC7-99EF-54AC5696FA7D}"/>
-              </a:ext>
-            </a:extLst>
-          </p:cNvPr>
-          <p:cNvSpPr txBox="1"/>
-          <p:nvPr/>
-        </p:nvSpPr>
-        <p:spPr>
-          <a:xfrm>
-            <a:off x="6834976" y="2262976"/>
-            <a:ext cx="4598313" cy="1200329"/>
-          </a:xfrm>
-          <a:prstGeom prst="rect">
-            <a:avLst/>
-          </a:prstGeom>
-          <a:noFill/>
-        </p:spPr>
-        <p:txBody>
-          <a:bodyPr wrap="square" rtlCol="1">
-            <a:spAutoFit/>
-          </a:bodyPr>
-          <a:lstStyle/>
-          <a:p>
-            <a:r>
-              <a:rPr lang="en-US" dirty="0"/>
-              <a:t>We can see that for vegetation category, the linear pipeline model had the most accurate prediction, test accuracy with 40.16% and train accuracy with 45.21% </a:t>
-            </a:r>
-            <a:endParaRPr lang="he-IL" dirty="0"/>
-          </a:p>
-        </p:txBody>
-      </p:sp>
     </p:spTree>
     <p:extLst>
       <p:ext uri="{BB962C8B-B14F-4D97-AF65-F5344CB8AC3E}">
@@ -7673,12 +7673,48 @@
           </a:p>
         </p:txBody>
       </p:sp>
+      <p:sp>
+        <p:nvSpPr>
+          <p:cNvPr id="7" name="תיבת טקסט 6">
+            <a:extLst>
+              <a:ext uri="{FF2B5EF4-FFF2-40B4-BE49-F238E27FC236}">
+                <a16:creationId xmlns:a16="http://schemas.microsoft.com/office/drawing/2014/main" id="{18E8E99E-BDC4-41C3-80D9-FBACD3FBFE0F}"/>
+              </a:ext>
+            </a:extLst>
+          </p:cNvPr>
+          <p:cNvSpPr txBox="1"/>
+          <p:nvPr/>
+        </p:nvSpPr>
+        <p:spPr>
+          <a:xfrm>
+            <a:off x="6834976" y="2262976"/>
+            <a:ext cx="4598313" cy="1200329"/>
+          </a:xfrm>
+          <a:prstGeom prst="rect">
+            <a:avLst/>
+          </a:prstGeom>
+          <a:noFill/>
+        </p:spPr>
+        <p:txBody>
+          <a:bodyPr wrap="square" rtlCol="1">
+            <a:spAutoFit/>
+          </a:bodyPr>
+          <a:lstStyle/>
+          <a:p>
+            <a:r>
+              <a:rPr lang="en-US" dirty="0"/>
+              <a:t>We can see that for land surface temperature category, the linear pipeline had the most accurate prediction, test accuracy with 97.70% and train accuracy with 97.74% </a:t>
+            </a:r>
+            <a:endParaRPr lang="he-IL" dirty="0"/>
+          </a:p>
+        </p:txBody>
+      </p:sp>
       <p:pic>
         <p:nvPicPr>
-          <p:cNvPr id="5" name="מציין מיקום תוכן 4">
+          <p:cNvPr id="12" name="מציין מיקום תוכן 11">
             <a:extLst>
               <a:ext uri="{FF2B5EF4-FFF2-40B4-BE49-F238E27FC236}">
-                <a16:creationId xmlns:a16="http://schemas.microsoft.com/office/drawing/2014/main" id="{3F7776E7-16EC-420C-99D3-0ED9C6FF4866}"/>
+                <a16:creationId xmlns:a16="http://schemas.microsoft.com/office/drawing/2014/main" id="{87C00432-D38F-4EC6-AC50-C8AC5BD90BEE}"/>
               </a:ext>
             </a:extLst>
           </p:cNvPr>
@@ -7703,47 +7739,11 @@
         </p:blipFill>
         <p:spPr>
           <a:xfrm>
-            <a:off x="1097280" y="1879155"/>
-            <a:ext cx="5483090" cy="4022725"/>
+            <a:off x="1097280" y="1737360"/>
+            <a:ext cx="5507623" cy="4022725"/>
           </a:xfrm>
         </p:spPr>
       </p:pic>
-      <p:sp>
-        <p:nvSpPr>
-          <p:cNvPr id="7" name="תיבת טקסט 6">
-            <a:extLst>
-              <a:ext uri="{FF2B5EF4-FFF2-40B4-BE49-F238E27FC236}">
-                <a16:creationId xmlns:a16="http://schemas.microsoft.com/office/drawing/2014/main" id="{18E8E99E-BDC4-41C3-80D9-FBACD3FBFE0F}"/>
-              </a:ext>
-            </a:extLst>
-          </p:cNvPr>
-          <p:cNvSpPr txBox="1"/>
-          <p:nvPr/>
-        </p:nvSpPr>
-        <p:spPr>
-          <a:xfrm>
-            <a:off x="6834976" y="2262976"/>
-            <a:ext cx="4598313" cy="1200329"/>
-          </a:xfrm>
-          <a:prstGeom prst="rect">
-            <a:avLst/>
-          </a:prstGeom>
-          <a:noFill/>
-        </p:spPr>
-        <p:txBody>
-          <a:bodyPr wrap="square" rtlCol="1">
-            <a:spAutoFit/>
-          </a:bodyPr>
-          <a:lstStyle/>
-          <a:p>
-            <a:r>
-              <a:rPr lang="en-US" dirty="0"/>
-              <a:t>We can see that for land surface temperature category, the naïve bayes had the most accurate prediction, test accuracy with 93.09% and train accuracy with 90.91% </a:t>
-            </a:r>
-            <a:endParaRPr lang="he-IL" dirty="0"/>
-          </a:p>
-        </p:txBody>
-      </p:sp>
     </p:spTree>
     <p:extLst>
       <p:ext uri="{BB962C8B-B14F-4D97-AF65-F5344CB8AC3E}">
@@ -7803,12 +7803,51 @@
           </a:p>
         </p:txBody>
       </p:sp>
+      <p:sp>
+        <p:nvSpPr>
+          <p:cNvPr id="6" name="תיבת טקסט 5">
+            <a:extLst>
+              <a:ext uri="{FF2B5EF4-FFF2-40B4-BE49-F238E27FC236}">
+                <a16:creationId xmlns:a16="http://schemas.microsoft.com/office/drawing/2014/main" id="{D6AD99DC-EC5B-443F-9267-293974D1CC22}"/>
+              </a:ext>
+            </a:extLst>
+          </p:cNvPr>
+          <p:cNvSpPr txBox="1"/>
+          <p:nvPr/>
+        </p:nvSpPr>
+        <p:spPr>
+          <a:xfrm>
+            <a:off x="6834976" y="2262976"/>
+            <a:ext cx="4598313" cy="1477328"/>
+          </a:xfrm>
+          <a:prstGeom prst="rect">
+            <a:avLst/>
+          </a:prstGeom>
+          <a:noFill/>
+        </p:spPr>
+        <p:txBody>
+          <a:bodyPr wrap="square" rtlCol="1">
+            <a:spAutoFit/>
+          </a:bodyPr>
+          <a:lstStyle/>
+          <a:p>
+            <a:r>
+              <a:rPr lang="en-US" dirty="0"/>
+              <a:t>We can see that for land surface temperature anomaly category, the linear pipeline model had the most accurate prediction, test accuracy with 85.98% and train accuracy with 86.91% </a:t>
+            </a:r>
+            <a:endParaRPr lang="he-IL" dirty="0"/>
+          </a:p>
+          <a:p>
+            <a:endParaRPr lang="he-IL" dirty="0"/>
+          </a:p>
+        </p:txBody>
+      </p:sp>
       <p:pic>
         <p:nvPicPr>
-          <p:cNvPr id="5" name="מציין מיקום תוכן 4">
+          <p:cNvPr id="12" name="מציין מיקום תוכן 11">
             <a:extLst>
               <a:ext uri="{FF2B5EF4-FFF2-40B4-BE49-F238E27FC236}">
-                <a16:creationId xmlns:a16="http://schemas.microsoft.com/office/drawing/2014/main" id="{8A32EFA0-CC2E-4340-BB24-9E4C5F821124}"/>
+                <a16:creationId xmlns:a16="http://schemas.microsoft.com/office/drawing/2014/main" id="{480D950A-6254-4511-B679-E6CA99504B0E}"/>
               </a:ext>
             </a:extLst>
           </p:cNvPr>
@@ -7833,47 +7872,11 @@
         </p:blipFill>
         <p:spPr>
           <a:xfrm>
-            <a:off x="1097280" y="1905469"/>
-            <a:ext cx="5483090" cy="4022725"/>
+            <a:off x="1097280" y="1808163"/>
+            <a:ext cx="5507623" cy="4022725"/>
           </a:xfrm>
         </p:spPr>
       </p:pic>
-      <p:sp>
-        <p:nvSpPr>
-          <p:cNvPr id="6" name="תיבת טקסט 5">
-            <a:extLst>
-              <a:ext uri="{FF2B5EF4-FFF2-40B4-BE49-F238E27FC236}">
-                <a16:creationId xmlns:a16="http://schemas.microsoft.com/office/drawing/2014/main" id="{D6AD99DC-EC5B-443F-9267-293974D1CC22}"/>
-              </a:ext>
-            </a:extLst>
-          </p:cNvPr>
-          <p:cNvSpPr txBox="1"/>
-          <p:nvPr/>
-        </p:nvSpPr>
-        <p:spPr>
-          <a:xfrm>
-            <a:off x="6834976" y="2262976"/>
-            <a:ext cx="4598313" cy="1477328"/>
-          </a:xfrm>
-          <a:prstGeom prst="rect">
-            <a:avLst/>
-          </a:prstGeom>
-          <a:noFill/>
-        </p:spPr>
-        <p:txBody>
-          <a:bodyPr wrap="square" rtlCol="1">
-            <a:spAutoFit/>
-          </a:bodyPr>
-          <a:lstStyle/>
-          <a:p>
-            <a:r>
-              <a:rPr lang="en-US" dirty="0"/>
-              <a:t>We can see that for land surface temperature anomaly category, linear bayesianridge and linear regression got the same result, test accuracy with 87.39% and train accuracy with 86.74% </a:t>
-            </a:r>
-            <a:endParaRPr lang="he-IL" dirty="0"/>
-          </a:p>
-        </p:txBody>
-      </p:sp>
     </p:spTree>
     <p:extLst>
       <p:ext uri="{BB962C8B-B14F-4D97-AF65-F5344CB8AC3E}">
@@ -7933,12 +7936,48 @@
           </a:p>
         </p:txBody>
       </p:sp>
+      <p:sp>
+        <p:nvSpPr>
+          <p:cNvPr id="7" name="תיבת טקסט 6">
+            <a:extLst>
+              <a:ext uri="{FF2B5EF4-FFF2-40B4-BE49-F238E27FC236}">
+                <a16:creationId xmlns:a16="http://schemas.microsoft.com/office/drawing/2014/main" id="{E7FEBB10-DF32-4792-BE99-40AF9907191F}"/>
+              </a:ext>
+            </a:extLst>
+          </p:cNvPr>
+          <p:cNvSpPr txBox="1"/>
+          <p:nvPr/>
+        </p:nvSpPr>
+        <p:spPr>
+          <a:xfrm>
+            <a:off x="6834976" y="2262976"/>
+            <a:ext cx="4598313" cy="1200329"/>
+          </a:xfrm>
+          <a:prstGeom prst="rect">
+            <a:avLst/>
+          </a:prstGeom>
+          <a:noFill/>
+        </p:spPr>
+        <p:txBody>
+          <a:bodyPr wrap="square" rtlCol="1">
+            <a:spAutoFit/>
+          </a:bodyPr>
+          <a:lstStyle/>
+          <a:p>
+            <a:r>
+              <a:rPr lang="en-US" dirty="0"/>
+              <a:t>We can see that for snow cover category, the linear pipeline model had the most accurate prediction, test accuracy with 94.55% and train accuracy with 95.28% </a:t>
+            </a:r>
+            <a:endParaRPr lang="he-IL" dirty="0"/>
+          </a:p>
+        </p:txBody>
+      </p:sp>
       <p:pic>
         <p:nvPicPr>
-          <p:cNvPr id="5" name="מציין מיקום תוכן 4">
+          <p:cNvPr id="12" name="מציין מיקום תוכן 11">
             <a:extLst>
               <a:ext uri="{FF2B5EF4-FFF2-40B4-BE49-F238E27FC236}">
-                <a16:creationId xmlns:a16="http://schemas.microsoft.com/office/drawing/2014/main" id="{9F65BD8D-6F8D-48D8-A441-ED6E8A35B51E}"/>
+                <a16:creationId xmlns:a16="http://schemas.microsoft.com/office/drawing/2014/main" id="{9DE08D83-07E1-4D6C-B4BA-AD1CD5A3AC9E}"/>
               </a:ext>
             </a:extLst>
           </p:cNvPr>
@@ -7963,47 +8002,11 @@
         </p:blipFill>
         <p:spPr>
           <a:xfrm>
-            <a:off x="1097280" y="1857271"/>
-            <a:ext cx="5483090" cy="4022725"/>
+            <a:off x="1097280" y="1737360"/>
+            <a:ext cx="5507623" cy="4022725"/>
           </a:xfrm>
         </p:spPr>
       </p:pic>
-      <p:sp>
-        <p:nvSpPr>
-          <p:cNvPr id="7" name="תיבת טקסט 6">
-            <a:extLst>
-              <a:ext uri="{FF2B5EF4-FFF2-40B4-BE49-F238E27FC236}">
-                <a16:creationId xmlns:a16="http://schemas.microsoft.com/office/drawing/2014/main" id="{E7FEBB10-DF32-4792-BE99-40AF9907191F}"/>
-              </a:ext>
-            </a:extLst>
-          </p:cNvPr>
-          <p:cNvSpPr txBox="1"/>
-          <p:nvPr/>
-        </p:nvSpPr>
-        <p:spPr>
-          <a:xfrm>
-            <a:off x="6834976" y="2262976"/>
-            <a:ext cx="4598313" cy="1200329"/>
-          </a:xfrm>
-          <a:prstGeom prst="rect">
-            <a:avLst/>
-          </a:prstGeom>
-          <a:noFill/>
-        </p:spPr>
-        <p:txBody>
-          <a:bodyPr wrap="square" rtlCol="1">
-            <a:spAutoFit/>
-          </a:bodyPr>
-          <a:lstStyle/>
-          <a:p>
-            <a:r>
-              <a:rPr lang="en-US" dirty="0"/>
-              <a:t>We can see that for snow cover category, the linear regression model had the most accurate prediction, test accuracy with 91.90% and train accuracy with 93.50% </a:t>
-            </a:r>
-            <a:endParaRPr lang="he-IL" dirty="0"/>
-          </a:p>
-        </p:txBody>
-      </p:sp>
     </p:spTree>
     <p:extLst>
       <p:ext uri="{BB962C8B-B14F-4D97-AF65-F5344CB8AC3E}">
@@ -8063,12 +8066,48 @@
           </a:p>
         </p:txBody>
       </p:sp>
+      <p:sp>
+        <p:nvSpPr>
+          <p:cNvPr id="6" name="תיבת טקסט 5">
+            <a:extLst>
+              <a:ext uri="{FF2B5EF4-FFF2-40B4-BE49-F238E27FC236}">
+                <a16:creationId xmlns:a16="http://schemas.microsoft.com/office/drawing/2014/main" id="{DB22DE65-1F28-49CF-AB56-D613C25A03B6}"/>
+              </a:ext>
+            </a:extLst>
+          </p:cNvPr>
+          <p:cNvSpPr txBox="1"/>
+          <p:nvPr/>
+        </p:nvSpPr>
+        <p:spPr>
+          <a:xfrm>
+            <a:off x="6834976" y="2262976"/>
+            <a:ext cx="4598313" cy="1200329"/>
+          </a:xfrm>
+          <a:prstGeom prst="rect">
+            <a:avLst/>
+          </a:prstGeom>
+          <a:noFill/>
+        </p:spPr>
+        <p:txBody>
+          <a:bodyPr wrap="square" rtlCol="1">
+            <a:spAutoFit/>
+          </a:bodyPr>
+          <a:lstStyle/>
+          <a:p>
+            <a:r>
+              <a:rPr lang="en-US" dirty="0"/>
+              <a:t>We can see that for fire category, the naive bayes model had the most accurate prediction, test accuracy with 99.98% and train accuracy with 99.93% </a:t>
+            </a:r>
+            <a:endParaRPr lang="he-IL" dirty="0"/>
+          </a:p>
+        </p:txBody>
+      </p:sp>
       <p:pic>
         <p:nvPicPr>
-          <p:cNvPr id="5" name="מציין מיקום תוכן 4">
+          <p:cNvPr id="12" name="מציין מיקום תוכן 11">
             <a:extLst>
               <a:ext uri="{FF2B5EF4-FFF2-40B4-BE49-F238E27FC236}">
-                <a16:creationId xmlns:a16="http://schemas.microsoft.com/office/drawing/2014/main" id="{639CA180-1249-4810-8680-5A2663C7893E}"/>
+                <a16:creationId xmlns:a16="http://schemas.microsoft.com/office/drawing/2014/main" id="{344360C0-0357-47F4-A0D6-D9BC716DC4D6}"/>
               </a:ext>
             </a:extLst>
           </p:cNvPr>
@@ -8093,47 +8132,11 @@
         </p:blipFill>
         <p:spPr>
           <a:xfrm>
-            <a:off x="1097280" y="1905469"/>
-            <a:ext cx="5483090" cy="4022725"/>
+            <a:off x="1097280" y="1823085"/>
+            <a:ext cx="5507623" cy="4022725"/>
           </a:xfrm>
         </p:spPr>
       </p:pic>
-      <p:sp>
-        <p:nvSpPr>
-          <p:cNvPr id="6" name="תיבת טקסט 5">
-            <a:extLst>
-              <a:ext uri="{FF2B5EF4-FFF2-40B4-BE49-F238E27FC236}">
-                <a16:creationId xmlns:a16="http://schemas.microsoft.com/office/drawing/2014/main" id="{DB22DE65-1F28-49CF-AB56-D613C25A03B6}"/>
-              </a:ext>
-            </a:extLst>
-          </p:cNvPr>
-          <p:cNvSpPr txBox="1"/>
-          <p:nvPr/>
-        </p:nvSpPr>
-        <p:spPr>
-          <a:xfrm>
-            <a:off x="6834976" y="2262976"/>
-            <a:ext cx="4598313" cy="1200329"/>
-          </a:xfrm>
-          <a:prstGeom prst="rect">
-            <a:avLst/>
-          </a:prstGeom>
-          <a:noFill/>
-        </p:spPr>
-        <p:txBody>
-          <a:bodyPr wrap="square" rtlCol="1">
-            <a:spAutoFit/>
-          </a:bodyPr>
-          <a:lstStyle/>
-          <a:p>
-            <a:r>
-              <a:rPr lang="en-US" dirty="0"/>
-              <a:t>We can see that for fire category, the naive bayes model had the most accurate prediction, test accuracy with 100% and train accuracy with 99.93% </a:t>
-            </a:r>
-            <a:endParaRPr lang="he-IL" dirty="0"/>
-          </a:p>
-        </p:txBody>
-      </p:sp>
     </p:spTree>
     <p:extLst>
       <p:ext uri="{BB962C8B-B14F-4D97-AF65-F5344CB8AC3E}">
@@ -8193,12 +8196,53 @@
           </a:p>
         </p:txBody>
       </p:sp>
+      <p:sp>
+        <p:nvSpPr>
+          <p:cNvPr id="6" name="תיבת טקסט 5">
+            <a:extLst>
+              <a:ext uri="{FF2B5EF4-FFF2-40B4-BE49-F238E27FC236}">
+                <a16:creationId xmlns:a16="http://schemas.microsoft.com/office/drawing/2014/main" id="{2577657D-F3C1-49F9-ADC5-AD27D5F8E937}"/>
+              </a:ext>
+            </a:extLst>
+          </p:cNvPr>
+          <p:cNvSpPr txBox="1"/>
+          <p:nvPr/>
+        </p:nvSpPr>
+        <p:spPr>
+          <a:xfrm>
+            <a:off x="6834976" y="2262976"/>
+            <a:ext cx="4598313" cy="1477328"/>
+          </a:xfrm>
+          <a:prstGeom prst="rect">
+            <a:avLst/>
+          </a:prstGeom>
+          <a:noFill/>
+        </p:spPr>
+        <p:txBody>
+          <a:bodyPr wrap="square" rtlCol="1">
+            <a:spAutoFit/>
+          </a:bodyPr>
+          <a:lstStyle/>
+          <a:p>
+            <a:r>
+              <a:rPr lang="en-US" dirty="0"/>
+              <a:t>We can see that for net primary productivity models category, the linear pipeline model had the most accurate prediction.</a:t>
+            </a:r>
+          </a:p>
+          <a:p>
+            <a:r>
+              <a:rPr lang="en-US" dirty="0"/>
+              <a:t>This model shouldn’t get into consideration because of his low prediction accuracy </a:t>
+            </a:r>
+          </a:p>
+        </p:txBody>
+      </p:sp>
       <p:pic>
         <p:nvPicPr>
-          <p:cNvPr id="5" name="מציין מיקום תוכן 4">
+          <p:cNvPr id="12" name="מציין מיקום תוכן 11">
             <a:extLst>
               <a:ext uri="{FF2B5EF4-FFF2-40B4-BE49-F238E27FC236}">
-                <a16:creationId xmlns:a16="http://schemas.microsoft.com/office/drawing/2014/main" id="{2FAEDBF3-8EC2-40C5-AB4D-5A3F4D480282}"/>
+                <a16:creationId xmlns:a16="http://schemas.microsoft.com/office/drawing/2014/main" id="{C70DDEF2-BBCD-4160-A8CF-D74C0AB70D8C}"/>
               </a:ext>
             </a:extLst>
           </p:cNvPr>
@@ -8223,52 +8267,11 @@
         </p:blipFill>
         <p:spPr>
           <a:xfrm>
-            <a:off x="1097280" y="1951517"/>
-            <a:ext cx="5483090" cy="4022725"/>
+            <a:off x="1036320" y="1737360"/>
+            <a:ext cx="5507623" cy="4022725"/>
           </a:xfrm>
         </p:spPr>
       </p:pic>
-      <p:sp>
-        <p:nvSpPr>
-          <p:cNvPr id="6" name="תיבת טקסט 5">
-            <a:extLst>
-              <a:ext uri="{FF2B5EF4-FFF2-40B4-BE49-F238E27FC236}">
-                <a16:creationId xmlns:a16="http://schemas.microsoft.com/office/drawing/2014/main" id="{2577657D-F3C1-49F9-ADC5-AD27D5F8E937}"/>
-              </a:ext>
-            </a:extLst>
-          </p:cNvPr>
-          <p:cNvSpPr txBox="1"/>
-          <p:nvPr/>
-        </p:nvSpPr>
-        <p:spPr>
-          <a:xfrm>
-            <a:off x="6834976" y="2262976"/>
-            <a:ext cx="4598313" cy="1754326"/>
-          </a:xfrm>
-          <a:prstGeom prst="rect">
-            <a:avLst/>
-          </a:prstGeom>
-          <a:noFill/>
-        </p:spPr>
-        <p:txBody>
-          <a:bodyPr wrap="square" rtlCol="1">
-            <a:spAutoFit/>
-          </a:bodyPr>
-          <a:lstStyle/>
-          <a:p>
-            <a:r>
-              <a:rPr lang="en-US" dirty="0"/>
-              <a:t>We can see that for net primary productivity models category, the naive bayes model had the most accurate prediction.</a:t>
-            </a:r>
-          </a:p>
-          <a:p>
-            <a:r>
-              <a:rPr lang="en-US" dirty="0"/>
-              <a:t>This model shouldn’t get into consideration because of his under fitting caused by high test accuracy but low train</a:t>
-            </a:r>
-          </a:p>
-        </p:txBody>
-      </p:sp>
     </p:spTree>
     <p:extLst>
       <p:ext uri="{BB962C8B-B14F-4D97-AF65-F5344CB8AC3E}">

</xml_diff>